<commit_message>
(back-end) Criado endpoints de feed - precisa ser melhorado
</commit_message>
<xml_diff>
--- a/documentacao/banco-de-dados/modelagem-logica/ModelagemFinal.pptx
+++ b/documentacao/banco-de-dados/modelagem-logica/ModelagemFinal.pptx
@@ -7,6 +7,7 @@
   <p:sldIdLst>
     <p:sldId id="256" r:id="rId2"/>
     <p:sldId id="257" r:id="rId3"/>
+    <p:sldId id="258" r:id="rId4"/>
   </p:sldIdLst>
   <p:sldSz cx="12192000" cy="6858000"/>
   <p:notesSz cx="6858000" cy="9144000"/>
@@ -260,7 +261,7 @@
           <a:p>
             <a:fld id="{3D88BA5E-3BB4-4B5F-A571-EA1BDEB72D49}" type="datetimeFigureOut">
               <a:rPr lang="en-US" smtClean="0"/>
-              <a:t>12/13/2020</a:t>
+              <a:t>2/26/2021</a:t>
             </a:fld>
             <a:endParaRPr lang="en-US"/>
           </a:p>
@@ -314,7 +315,7 @@
           <a:p>
             <a:fld id="{D042DEDB-06E5-4D9D-BDE7-1ECF6C57F105}" type="slidenum">
               <a:rPr lang="en-US" smtClean="0"/>
-              <a:t>‹#›</a:t>
+              <a:t>‹nº›</a:t>
             </a:fld>
             <a:endParaRPr lang="en-US"/>
           </a:p>
@@ -458,7 +459,7 @@
           <a:p>
             <a:fld id="{3D88BA5E-3BB4-4B5F-A571-EA1BDEB72D49}" type="datetimeFigureOut">
               <a:rPr lang="en-US" smtClean="0"/>
-              <a:t>12/13/2020</a:t>
+              <a:t>2/26/2021</a:t>
             </a:fld>
             <a:endParaRPr lang="en-US"/>
           </a:p>
@@ -512,7 +513,7 @@
           <a:p>
             <a:fld id="{D042DEDB-06E5-4D9D-BDE7-1ECF6C57F105}" type="slidenum">
               <a:rPr lang="en-US" smtClean="0"/>
-              <a:t>‹#›</a:t>
+              <a:t>‹nº›</a:t>
             </a:fld>
             <a:endParaRPr lang="en-US"/>
           </a:p>
@@ -666,7 +667,7 @@
           <a:p>
             <a:fld id="{3D88BA5E-3BB4-4B5F-A571-EA1BDEB72D49}" type="datetimeFigureOut">
               <a:rPr lang="en-US" smtClean="0"/>
-              <a:t>12/13/2020</a:t>
+              <a:t>2/26/2021</a:t>
             </a:fld>
             <a:endParaRPr lang="en-US"/>
           </a:p>
@@ -720,7 +721,7 @@
           <a:p>
             <a:fld id="{D042DEDB-06E5-4D9D-BDE7-1ECF6C57F105}" type="slidenum">
               <a:rPr lang="en-US" smtClean="0"/>
-              <a:t>‹#›</a:t>
+              <a:t>‹nº›</a:t>
             </a:fld>
             <a:endParaRPr lang="en-US"/>
           </a:p>
@@ -864,7 +865,7 @@
           <a:p>
             <a:fld id="{3D88BA5E-3BB4-4B5F-A571-EA1BDEB72D49}" type="datetimeFigureOut">
               <a:rPr lang="en-US" smtClean="0"/>
-              <a:t>12/13/2020</a:t>
+              <a:t>2/26/2021</a:t>
             </a:fld>
             <a:endParaRPr lang="en-US"/>
           </a:p>
@@ -918,7 +919,7 @@
           <a:p>
             <a:fld id="{D042DEDB-06E5-4D9D-BDE7-1ECF6C57F105}" type="slidenum">
               <a:rPr lang="en-US" smtClean="0"/>
-              <a:t>‹#›</a:t>
+              <a:t>‹nº›</a:t>
             </a:fld>
             <a:endParaRPr lang="en-US"/>
           </a:p>
@@ -1139,7 +1140,7 @@
           <a:p>
             <a:fld id="{3D88BA5E-3BB4-4B5F-A571-EA1BDEB72D49}" type="datetimeFigureOut">
               <a:rPr lang="en-US" smtClean="0"/>
-              <a:t>12/13/2020</a:t>
+              <a:t>2/26/2021</a:t>
             </a:fld>
             <a:endParaRPr lang="en-US"/>
           </a:p>
@@ -1193,7 +1194,7 @@
           <a:p>
             <a:fld id="{D042DEDB-06E5-4D9D-BDE7-1ECF6C57F105}" type="slidenum">
               <a:rPr lang="en-US" smtClean="0"/>
-              <a:t>‹#›</a:t>
+              <a:t>‹nº›</a:t>
             </a:fld>
             <a:endParaRPr lang="en-US"/>
           </a:p>
@@ -1404,7 +1405,7 @@
           <a:p>
             <a:fld id="{3D88BA5E-3BB4-4B5F-A571-EA1BDEB72D49}" type="datetimeFigureOut">
               <a:rPr lang="en-US" smtClean="0"/>
-              <a:t>12/13/2020</a:t>
+              <a:t>2/26/2021</a:t>
             </a:fld>
             <a:endParaRPr lang="en-US"/>
           </a:p>
@@ -1458,7 +1459,7 @@
           <a:p>
             <a:fld id="{D042DEDB-06E5-4D9D-BDE7-1ECF6C57F105}" type="slidenum">
               <a:rPr lang="en-US" smtClean="0"/>
-              <a:t>‹#›</a:t>
+              <a:t>‹nº›</a:t>
             </a:fld>
             <a:endParaRPr lang="en-US"/>
           </a:p>
@@ -1816,7 +1817,7 @@
           <a:p>
             <a:fld id="{3D88BA5E-3BB4-4B5F-A571-EA1BDEB72D49}" type="datetimeFigureOut">
               <a:rPr lang="en-US" smtClean="0"/>
-              <a:t>12/13/2020</a:t>
+              <a:t>2/26/2021</a:t>
             </a:fld>
             <a:endParaRPr lang="en-US"/>
           </a:p>
@@ -1870,7 +1871,7 @@
           <a:p>
             <a:fld id="{D042DEDB-06E5-4D9D-BDE7-1ECF6C57F105}" type="slidenum">
               <a:rPr lang="en-US" smtClean="0"/>
-              <a:t>‹#›</a:t>
+              <a:t>‹nº›</a:t>
             </a:fld>
             <a:endParaRPr lang="en-US"/>
           </a:p>
@@ -1957,7 +1958,7 @@
           <a:p>
             <a:fld id="{3D88BA5E-3BB4-4B5F-A571-EA1BDEB72D49}" type="datetimeFigureOut">
               <a:rPr lang="en-US" smtClean="0"/>
-              <a:t>12/13/2020</a:t>
+              <a:t>2/26/2021</a:t>
             </a:fld>
             <a:endParaRPr lang="en-US"/>
           </a:p>
@@ -2011,7 +2012,7 @@
           <a:p>
             <a:fld id="{D042DEDB-06E5-4D9D-BDE7-1ECF6C57F105}" type="slidenum">
               <a:rPr lang="en-US" smtClean="0"/>
-              <a:t>‹#›</a:t>
+              <a:t>‹nº›</a:t>
             </a:fld>
             <a:endParaRPr lang="en-US"/>
           </a:p>
@@ -2070,7 +2071,7 @@
           <a:p>
             <a:fld id="{3D88BA5E-3BB4-4B5F-A571-EA1BDEB72D49}" type="datetimeFigureOut">
               <a:rPr lang="en-US" smtClean="0"/>
-              <a:t>12/13/2020</a:t>
+              <a:t>2/26/2021</a:t>
             </a:fld>
             <a:endParaRPr lang="en-US"/>
           </a:p>
@@ -2124,7 +2125,7 @@
           <a:p>
             <a:fld id="{D042DEDB-06E5-4D9D-BDE7-1ECF6C57F105}" type="slidenum">
               <a:rPr lang="en-US" smtClean="0"/>
-              <a:t>‹#›</a:t>
+              <a:t>‹nº›</a:t>
             </a:fld>
             <a:endParaRPr lang="en-US"/>
           </a:p>
@@ -2381,7 +2382,7 @@
           <a:p>
             <a:fld id="{3D88BA5E-3BB4-4B5F-A571-EA1BDEB72D49}" type="datetimeFigureOut">
               <a:rPr lang="en-US" smtClean="0"/>
-              <a:t>12/13/2020</a:t>
+              <a:t>2/26/2021</a:t>
             </a:fld>
             <a:endParaRPr lang="en-US"/>
           </a:p>
@@ -2435,7 +2436,7 @@
           <a:p>
             <a:fld id="{D042DEDB-06E5-4D9D-BDE7-1ECF6C57F105}" type="slidenum">
               <a:rPr lang="en-US" smtClean="0"/>
-              <a:t>‹#›</a:t>
+              <a:t>‹nº›</a:t>
             </a:fld>
             <a:endParaRPr lang="en-US"/>
           </a:p>
@@ -2669,7 +2670,7 @@
           <a:p>
             <a:fld id="{3D88BA5E-3BB4-4B5F-A571-EA1BDEB72D49}" type="datetimeFigureOut">
               <a:rPr lang="en-US" smtClean="0"/>
-              <a:t>12/13/2020</a:t>
+              <a:t>2/26/2021</a:t>
             </a:fld>
             <a:endParaRPr lang="en-US"/>
           </a:p>
@@ -2723,7 +2724,7 @@
           <a:p>
             <a:fld id="{D042DEDB-06E5-4D9D-BDE7-1ECF6C57F105}" type="slidenum">
               <a:rPr lang="en-US" smtClean="0"/>
-              <a:t>‹#›</a:t>
+              <a:t>‹nº›</a:t>
             </a:fld>
             <a:endParaRPr lang="en-US"/>
           </a:p>
@@ -2910,7 +2911,7 @@
           <a:p>
             <a:fld id="{3D88BA5E-3BB4-4B5F-A571-EA1BDEB72D49}" type="datetimeFigureOut">
               <a:rPr lang="en-US" smtClean="0"/>
-              <a:t>12/13/2020</a:t>
+              <a:t>2/26/2021</a:t>
             </a:fld>
             <a:endParaRPr lang="en-US"/>
           </a:p>
@@ -3000,7 +3001,7 @@
           <a:p>
             <a:fld id="{D042DEDB-06E5-4D9D-BDE7-1ECF6C57F105}" type="slidenum">
               <a:rPr lang="en-US" smtClean="0"/>
-              <a:t>‹#›</a:t>
+              <a:t>‹nº›</a:t>
             </a:fld>
             <a:endParaRPr lang="en-US"/>
           </a:p>
@@ -3430,6 +3431,351 @@
 </p:sld>
 </file>
 
+<file path=ppt/slides/slide3.xml><?xml version="1.0" encoding="utf-8"?>
+<p:sld xmlns:a="http://schemas.openxmlformats.org/drawingml/2006/main" xmlns:r="http://schemas.openxmlformats.org/officeDocument/2006/relationships" xmlns:p="http://schemas.openxmlformats.org/presentationml/2006/main">
+  <p:cSld>
+    <p:spTree>
+      <p:nvGrpSpPr>
+        <p:cNvPr id="1" name=""/>
+        <p:cNvGrpSpPr/>
+        <p:nvPr/>
+      </p:nvGrpSpPr>
+      <p:grpSpPr>
+        <a:xfrm>
+          <a:off x="0" y="0"/>
+          <a:ext cx="0" cy="0"/>
+          <a:chOff x="0" y="0"/>
+          <a:chExt cx="0" cy="0"/>
+        </a:xfrm>
+      </p:grpSpPr>
+      <p:pic>
+        <p:nvPicPr>
+          <p:cNvPr id="4" name="Picture 3">
+            <a:extLst>
+              <a:ext uri="{FF2B5EF4-FFF2-40B4-BE49-F238E27FC236}">
+                <a16:creationId xmlns:a16="http://schemas.microsoft.com/office/drawing/2014/main" id="{395BA169-C524-4838-9115-3170E409AE39}"/>
+              </a:ext>
+            </a:extLst>
+          </p:cNvPr>
+          <p:cNvPicPr>
+            <a:picLocks noChangeAspect="1"/>
+          </p:cNvPicPr>
+          <p:nvPr/>
+        </p:nvPicPr>
+        <p:blipFill>
+          <a:blip r:embed="rId2"/>
+          <a:stretch>
+            <a:fillRect/>
+          </a:stretch>
+        </p:blipFill>
+        <p:spPr>
+          <a:xfrm>
+            <a:off x="2365693" y="305838"/>
+            <a:ext cx="8422548" cy="5817813"/>
+          </a:xfrm>
+          <a:prstGeom prst="rect">
+            <a:avLst/>
+          </a:prstGeom>
+        </p:spPr>
+      </p:pic>
+      <p:sp>
+        <p:nvSpPr>
+          <p:cNvPr id="6" name="Retângulo 5">
+            <a:extLst>
+              <a:ext uri="{FF2B5EF4-FFF2-40B4-BE49-F238E27FC236}">
+                <a16:creationId xmlns:a16="http://schemas.microsoft.com/office/drawing/2014/main" id="{43473EA5-1C3F-4A3E-87BC-E8B09AF83B80}"/>
+              </a:ext>
+            </a:extLst>
+          </p:cNvPr>
+          <p:cNvSpPr/>
+          <p:nvPr/>
+        </p:nvSpPr>
+        <p:spPr>
+          <a:xfrm>
+            <a:off x="478172" y="2262593"/>
+            <a:ext cx="1644242" cy="1904301"/>
+          </a:xfrm>
+          <a:prstGeom prst="rect">
+            <a:avLst/>
+          </a:prstGeom>
+          <a:solidFill>
+            <a:schemeClr val="bg1"/>
+          </a:solidFill>
+          <a:ln>
+            <a:solidFill>
+              <a:schemeClr val="tx1"/>
+            </a:solidFill>
+          </a:ln>
+        </p:spPr>
+        <p:style>
+          <a:lnRef idx="2">
+            <a:schemeClr val="dk1">
+              <a:shade val="50000"/>
+            </a:schemeClr>
+          </a:lnRef>
+          <a:fillRef idx="1">
+            <a:schemeClr val="dk1"/>
+          </a:fillRef>
+          <a:effectRef idx="0">
+            <a:schemeClr val="dk1"/>
+          </a:effectRef>
+          <a:fontRef idx="minor">
+            <a:schemeClr val="lt1"/>
+          </a:fontRef>
+        </p:style>
+        <p:txBody>
+          <a:bodyPr rtlCol="0" anchor="ctr"/>
+          <a:lstStyle/>
+          <a:p>
+            <a:pPr algn="ctr"/>
+            <a:r>
+              <a:rPr lang="pt-BR" sz="1000" dirty="0" err="1">
+                <a:solidFill>
+                  <a:schemeClr val="tx1"/>
+                </a:solidFill>
+                <a:latin typeface="Arial" panose="020B0604020202020204" pitchFamily="34" charset="0"/>
+                <a:cs typeface="Arial" panose="020B0604020202020204" pitchFamily="34" charset="0"/>
+              </a:rPr>
+              <a:t>publicacao</a:t>
+            </a:r>
+            <a:endParaRPr lang="pt-BR" sz="1000" dirty="0">
+              <a:solidFill>
+                <a:schemeClr val="tx1"/>
+              </a:solidFill>
+              <a:latin typeface="Arial" panose="020B0604020202020204" pitchFamily="34" charset="0"/>
+              <a:cs typeface="Arial" panose="020B0604020202020204" pitchFamily="34" charset="0"/>
+            </a:endParaRPr>
+          </a:p>
+          <a:p>
+            <a:pPr algn="ctr"/>
+            <a:endParaRPr lang="pt-BR" sz="1000" dirty="0">
+              <a:solidFill>
+                <a:schemeClr val="tx1"/>
+              </a:solidFill>
+              <a:latin typeface="Arial" panose="020B0604020202020204" pitchFamily="34" charset="0"/>
+              <a:cs typeface="Arial" panose="020B0604020202020204" pitchFamily="34" charset="0"/>
+            </a:endParaRPr>
+          </a:p>
+          <a:p>
+            <a:endParaRPr lang="pt-BR" sz="1000" dirty="0">
+              <a:solidFill>
+                <a:schemeClr val="tx1"/>
+              </a:solidFill>
+              <a:latin typeface="Arial" panose="020B0604020202020204" pitchFamily="34" charset="0"/>
+              <a:cs typeface="Arial" panose="020B0604020202020204" pitchFamily="34" charset="0"/>
+            </a:endParaRPr>
+          </a:p>
+          <a:p>
+            <a:r>
+              <a:rPr lang="pt-BR" sz="1000" dirty="0">
+                <a:solidFill>
+                  <a:schemeClr val="tx1"/>
+                </a:solidFill>
+                <a:latin typeface="Arial" panose="020B0604020202020204" pitchFamily="34" charset="0"/>
+                <a:cs typeface="Arial" panose="020B0604020202020204" pitchFamily="34" charset="0"/>
+              </a:rPr>
+              <a:t>id </a:t>
+            </a:r>
+            <a:r>
+              <a:rPr lang="pt-BR" sz="1000" dirty="0" err="1">
+                <a:solidFill>
+                  <a:schemeClr val="tx1"/>
+                </a:solidFill>
+                <a:latin typeface="Arial" panose="020B0604020202020204" pitchFamily="34" charset="0"/>
+                <a:cs typeface="Arial" panose="020B0604020202020204" pitchFamily="34" charset="0"/>
+              </a:rPr>
+              <a:t>int</a:t>
+            </a:r>
+            <a:r>
+              <a:rPr lang="pt-BR" sz="1000" dirty="0">
+                <a:solidFill>
+                  <a:schemeClr val="tx1"/>
+                </a:solidFill>
+                <a:latin typeface="Arial" panose="020B0604020202020204" pitchFamily="34" charset="0"/>
+                <a:cs typeface="Arial" panose="020B0604020202020204" pitchFamily="34" charset="0"/>
+              </a:rPr>
+              <a:t> (PK)</a:t>
+            </a:r>
+          </a:p>
+          <a:p>
+            <a:r>
+              <a:rPr lang="pt-BR" sz="1000" dirty="0" err="1">
+                <a:solidFill>
+                  <a:schemeClr val="tx1"/>
+                </a:solidFill>
+                <a:latin typeface="Arial" panose="020B0604020202020204" pitchFamily="34" charset="0"/>
+                <a:cs typeface="Arial" panose="020B0604020202020204" pitchFamily="34" charset="0"/>
+              </a:rPr>
+              <a:t>descricao</a:t>
+            </a:r>
+            <a:r>
+              <a:rPr lang="pt-BR" sz="1000" dirty="0">
+                <a:solidFill>
+                  <a:schemeClr val="tx1"/>
+                </a:solidFill>
+                <a:latin typeface="Arial" panose="020B0604020202020204" pitchFamily="34" charset="0"/>
+                <a:cs typeface="Arial" panose="020B0604020202020204" pitchFamily="34" charset="0"/>
+              </a:rPr>
+              <a:t> </a:t>
+            </a:r>
+            <a:r>
+              <a:rPr lang="pt-BR" sz="1000" dirty="0" err="1">
+                <a:solidFill>
+                  <a:schemeClr val="tx1"/>
+                </a:solidFill>
+                <a:latin typeface="Arial" panose="020B0604020202020204" pitchFamily="34" charset="0"/>
+                <a:cs typeface="Arial" panose="020B0604020202020204" pitchFamily="34" charset="0"/>
+              </a:rPr>
+              <a:t>varchar</a:t>
+            </a:r>
+            <a:r>
+              <a:rPr lang="pt-BR" sz="1000" dirty="0">
+                <a:solidFill>
+                  <a:schemeClr val="tx1"/>
+                </a:solidFill>
+                <a:latin typeface="Arial" panose="020B0604020202020204" pitchFamily="34" charset="0"/>
+                <a:cs typeface="Arial" panose="020B0604020202020204" pitchFamily="34" charset="0"/>
+              </a:rPr>
+              <a:t>(200)</a:t>
+            </a:r>
+          </a:p>
+          <a:p>
+            <a:r>
+              <a:rPr lang="pt-BR" sz="1000" dirty="0">
+                <a:solidFill>
+                  <a:schemeClr val="tx1"/>
+                </a:solidFill>
+                <a:latin typeface="Arial" panose="020B0604020202020204" pitchFamily="34" charset="0"/>
+                <a:cs typeface="Arial" panose="020B0604020202020204" pitchFamily="34" charset="0"/>
+              </a:rPr>
+              <a:t>imagem </a:t>
+            </a:r>
+            <a:r>
+              <a:rPr lang="pt-BR" sz="1000" dirty="0" err="1">
+                <a:solidFill>
+                  <a:schemeClr val="tx1"/>
+                </a:solidFill>
+                <a:latin typeface="Arial" panose="020B0604020202020204" pitchFamily="34" charset="0"/>
+                <a:cs typeface="Arial" panose="020B0604020202020204" pitchFamily="34" charset="0"/>
+              </a:rPr>
+              <a:t>varchar</a:t>
+            </a:r>
+            <a:r>
+              <a:rPr lang="pt-BR" sz="1000" dirty="0">
+                <a:solidFill>
+                  <a:schemeClr val="tx1"/>
+                </a:solidFill>
+                <a:latin typeface="Arial" panose="020B0604020202020204" pitchFamily="34" charset="0"/>
+                <a:cs typeface="Arial" panose="020B0604020202020204" pitchFamily="34" charset="0"/>
+              </a:rPr>
+              <a:t>(172)</a:t>
+            </a:r>
+          </a:p>
+          <a:p>
+            <a:r>
+              <a:rPr lang="pt-BR" sz="1000" dirty="0">
+                <a:solidFill>
+                  <a:schemeClr val="tx1"/>
+                </a:solidFill>
+                <a:latin typeface="Arial" panose="020B0604020202020204" pitchFamily="34" charset="0"/>
+                <a:cs typeface="Arial" panose="020B0604020202020204" pitchFamily="34" charset="0"/>
+              </a:rPr>
+              <a:t>Curtidas </a:t>
+            </a:r>
+            <a:r>
+              <a:rPr lang="pt-BR" sz="1000" dirty="0" err="1">
+                <a:solidFill>
+                  <a:schemeClr val="tx1"/>
+                </a:solidFill>
+                <a:latin typeface="Arial" panose="020B0604020202020204" pitchFamily="34" charset="0"/>
+                <a:cs typeface="Arial" panose="020B0604020202020204" pitchFamily="34" charset="0"/>
+              </a:rPr>
+              <a:t>int</a:t>
+            </a:r>
+            <a:endParaRPr lang="pt-BR" sz="1000" dirty="0">
+              <a:solidFill>
+                <a:schemeClr val="tx1"/>
+              </a:solidFill>
+              <a:latin typeface="Arial" panose="020B0604020202020204" pitchFamily="34" charset="0"/>
+              <a:cs typeface="Arial" panose="020B0604020202020204" pitchFamily="34" charset="0"/>
+            </a:endParaRPr>
+          </a:p>
+          <a:p>
+            <a:r>
+              <a:rPr lang="pt-BR" sz="1000" dirty="0" err="1">
+                <a:solidFill>
+                  <a:schemeClr val="tx1"/>
+                </a:solidFill>
+                <a:latin typeface="Arial" panose="020B0604020202020204" pitchFamily="34" charset="0"/>
+                <a:cs typeface="Arial" panose="020B0604020202020204" pitchFamily="34" charset="0"/>
+              </a:rPr>
+              <a:t>id_usuario</a:t>
+            </a:r>
+            <a:r>
+              <a:rPr lang="pt-BR" sz="1000" dirty="0">
+                <a:solidFill>
+                  <a:schemeClr val="tx1"/>
+                </a:solidFill>
+                <a:latin typeface="Arial" panose="020B0604020202020204" pitchFamily="34" charset="0"/>
+                <a:cs typeface="Arial" panose="020B0604020202020204" pitchFamily="34" charset="0"/>
+              </a:rPr>
+              <a:t> </a:t>
+            </a:r>
+            <a:r>
+              <a:rPr lang="pt-BR" sz="1000" dirty="0" err="1">
+                <a:solidFill>
+                  <a:schemeClr val="tx1"/>
+                </a:solidFill>
+                <a:latin typeface="Arial" panose="020B0604020202020204" pitchFamily="34" charset="0"/>
+                <a:cs typeface="Arial" panose="020B0604020202020204" pitchFamily="34" charset="0"/>
+              </a:rPr>
+              <a:t>int</a:t>
+            </a:r>
+            <a:endParaRPr lang="pt-BR" sz="1000" dirty="0">
+              <a:solidFill>
+                <a:schemeClr val="tx1"/>
+              </a:solidFill>
+              <a:latin typeface="Arial" panose="020B0604020202020204" pitchFamily="34" charset="0"/>
+              <a:cs typeface="Arial" panose="020B0604020202020204" pitchFamily="34" charset="0"/>
+            </a:endParaRPr>
+          </a:p>
+          <a:p>
+            <a:r>
+              <a:rPr lang="pt-BR" sz="1000" dirty="0" err="1">
+                <a:solidFill>
+                  <a:schemeClr val="tx1"/>
+                </a:solidFill>
+                <a:latin typeface="Arial" panose="020B0604020202020204" pitchFamily="34" charset="0"/>
+                <a:cs typeface="Arial" panose="020B0604020202020204" pitchFamily="34" charset="0"/>
+              </a:rPr>
+              <a:t>tipo_usuario</a:t>
+            </a:r>
+            <a:r>
+              <a:rPr lang="pt-BR" sz="1000" dirty="0">
+                <a:solidFill>
+                  <a:schemeClr val="tx1"/>
+                </a:solidFill>
+                <a:latin typeface="Arial" panose="020B0604020202020204" pitchFamily="34" charset="0"/>
+                <a:cs typeface="Arial" panose="020B0604020202020204" pitchFamily="34" charset="0"/>
+              </a:rPr>
+              <a:t> char(2)</a:t>
+            </a:r>
+          </a:p>
+        </p:txBody>
+      </p:sp>
+    </p:spTree>
+    <p:extLst>
+      <p:ext uri="{BB962C8B-B14F-4D97-AF65-F5344CB8AC3E}">
+        <p14:creationId xmlns:p14="http://schemas.microsoft.com/office/powerpoint/2010/main" val="3921865334"/>
+      </p:ext>
+    </p:extLst>
+  </p:cSld>
+  <p:clrMapOvr>
+    <a:masterClrMapping/>
+  </p:clrMapOvr>
+</p:sld>
+</file>
+
 <file path=ppt/theme/theme1.xml><?xml version="1.0" encoding="utf-8"?>
 <a:theme xmlns:a="http://schemas.openxmlformats.org/drawingml/2006/main" name="Office Theme">
   <a:themeElements>

</xml_diff>